<commit_message>
stevens update 11/13 1109pm
</commit_message>
<xml_diff>
--- a/State Partisan Control affects on Covid.pptx
+++ b/State Partisan Control affects on Covid.pptx
@@ -6398,10 +6398,10 @@
       </p:sp>
       <p:pic>
         <p:nvPicPr>
-          <p:cNvPr id="4" name="Content Placeholder 4">
+          <p:cNvPr id="6" name="Picture 5">
             <a:extLst>
               <a:ext uri="{FF2B5EF4-FFF2-40B4-BE49-F238E27FC236}">
-                <a16:creationId xmlns:a16="http://schemas.microsoft.com/office/drawing/2014/main" id="{E0AA6D7F-ACFD-4B74-AFCB-BF7B19670C00}"/>
+                <a16:creationId xmlns:a16="http://schemas.microsoft.com/office/drawing/2014/main" id="{226C4FF3-B0BA-4AC7-A700-683E3977133C}"/>
               </a:ext>
             </a:extLst>
           </p:cNvPr>
@@ -6424,8 +6424,8 @@
         </p:blipFill>
         <p:spPr>
           <a:xfrm>
-            <a:off x="6966132" y="2147990"/>
-            <a:ext cx="4661729" cy="3403282"/>
+            <a:off x="6812280" y="2105406"/>
+            <a:ext cx="4864696" cy="3312414"/>
           </a:xfrm>
           <a:prstGeom prst="rect">
             <a:avLst/>
@@ -7129,7 +7129,7 @@
         <p:spPr>
           <a:xfrm>
             <a:off x="1006113" y="1859280"/>
-            <a:ext cx="8656867" cy="923330"/>
+            <a:ext cx="8656867" cy="1200329"/>
           </a:xfrm>
           <a:prstGeom prst="rect">
             <a:avLst/>
@@ -7145,6 +7145,12 @@
             <a:r>
               <a:rPr lang="en-US" dirty="0"/>
               <a:t>Taking our analysis one step further, we created code for the user to input a specific state</a:t>
+            </a:r>
+          </a:p>
+          <a:p>
+            <a:r>
+              <a:rPr lang="en-US" dirty="0"/>
+              <a:t>	- The plots are easily updatable for each state</a:t>
             </a:r>
           </a:p>
           <a:p>
@@ -7283,7 +7289,7 @@
             </a:pPr>
             <a:r>
               <a:rPr lang="en-US" dirty="0"/>
-              <a:t>Republican states took a more progressive approach </a:t>
+              <a:t>Republican states took an approach less disruptive to businesses </a:t>
             </a:r>
           </a:p>
           <a:p>

</xml_diff>